<commit_message>
Finalização dos insights magalu - update slide
</commit_message>
<xml_diff>
--- a/Cluster de texto – twint.pptx
+++ b/Cluster de texto – twint.pptx
@@ -14963,8 +14963,8 @@
         </p:nvSpPr>
         <p:spPr>
           <a:xfrm>
-            <a:off x="4069724" y="2396879"/>
-            <a:ext cx="8023537" cy="3256946"/>
+            <a:off x="4018208" y="2395470"/>
+            <a:ext cx="8075053" cy="3258355"/>
           </a:xfrm>
           <a:prstGeom prst="rect">
             <a:avLst/>
@@ -18050,15 +18050,6 @@
 </file>
 
 <file path=customXml/item2.xml><?xml version="1.0" encoding="utf-8"?>
-<?mso-contentType ?>
-<FormTemplates xmlns="http://schemas.microsoft.com/sharepoint/v3/contenttype/forms">
-  <Display>DocumentLibraryForm</Display>
-  <Edit>DocumentLibraryForm</Edit>
-  <New>DocumentLibraryForm</New>
-</FormTemplates>
-</file>
-
-<file path=customXml/item3.xml><?xml version="1.0" encoding="utf-8"?>
 <ct:contentTypeSchema xmlns:ct="http://schemas.microsoft.com/office/2006/metadata/contentType" xmlns:ma="http://schemas.microsoft.com/office/2006/metadata/properties/metaAttributes" ct:_="" ma:_="" ma:contentTypeName="Document" ma:contentTypeID="0x01010079F111ED35F8CC479449609E8A0923A6" ma:contentTypeVersion="11" ma:contentTypeDescription="Create a new document." ma:contentTypeScope="" ma:versionID="9677210f24a1be23c92c90fd886aa0aa">
   <xsd:schema xmlns:xsd="http://www.w3.org/2001/XMLSchema" xmlns:xs="http://www.w3.org/2001/XMLSchema" xmlns:p="http://schemas.microsoft.com/office/2006/metadata/properties" xmlns:ns2="71af3243-3dd4-4a8d-8c0d-dd76da1f02a5" xmlns:ns3="16c05727-aa75-4e4a-9b5f-8a80a1165891" targetNamespace="http://schemas.microsoft.com/office/2006/metadata/properties" ma:root="true" ma:fieldsID="60e05723c5c1908df1a1a4ebf11d344e" ns2:_="" ns3:_="">
     <xsd:import namespace="71af3243-3dd4-4a8d-8c0d-dd76da1f02a5"/>
@@ -18269,6 +18260,15 @@
 </ct:contentTypeSchema>
 </file>
 
+<file path=customXml/item3.xml><?xml version="1.0" encoding="utf-8"?>
+<?mso-contentType ?>
+<FormTemplates xmlns="http://schemas.microsoft.com/sharepoint/v3/contenttype/forms">
+  <Display>DocumentLibraryForm</Display>
+  <Edit>DocumentLibraryForm</Edit>
+  <New>DocumentLibraryForm</New>
+</FormTemplates>
+</file>
+
 <file path=customXml/itemProps1.xml><?xml version="1.0" encoding="utf-8"?>
 <ds:datastoreItem xmlns:ds="http://schemas.openxmlformats.org/officeDocument/2006/customXml" ds:itemID="{788A2F88-55C5-4ED1-9541-807C65424763}">
   <ds:schemaRefs>
@@ -18287,14 +18287,6 @@
 </file>
 
 <file path=customXml/itemProps2.xml><?xml version="1.0" encoding="utf-8"?>
-<ds:datastoreItem xmlns:ds="http://schemas.openxmlformats.org/officeDocument/2006/customXml" ds:itemID="{4F44C90D-2A62-4985-9618-3460247437B1}">
-  <ds:schemaRefs>
-    <ds:schemaRef ds:uri="http://schemas.microsoft.com/sharepoint/v3/contenttype/forms"/>
-  </ds:schemaRefs>
-</ds:datastoreItem>
-</file>
-
-<file path=customXml/itemProps3.xml><?xml version="1.0" encoding="utf-8"?>
 <ds:datastoreItem xmlns:ds="http://schemas.openxmlformats.org/officeDocument/2006/customXml" ds:itemID="{B61EAB5F-88FC-4FAE-AE3C-037A3C365EB8}">
   <ds:schemaRefs>
     <ds:schemaRef ds:uri="http://schemas.microsoft.com/office/2006/metadata/contentType"/>
@@ -18311,4 +18303,12 @@
     <ds:schemaRef ds:uri="http://schemas.microsoft.com/internal/obd"/>
   </ds:schemaRefs>
 </ds:datastoreItem>
+</file>
+
+<file path=customXml/itemProps3.xml><?xml version="1.0" encoding="utf-8"?>
+<ds:datastoreItem xmlns:ds="http://schemas.openxmlformats.org/officeDocument/2006/customXml" ds:itemID="{4F44C90D-2A62-4985-9618-3460247437B1}">
+  <ds:schemaRefs>
+    <ds:schemaRef ds:uri="http://schemas.microsoft.com/sharepoint/v3/contenttype/forms"/>
+  </ds:schemaRefs>
+</ds:datastoreItem>
 </file>
</xml_diff>